<commit_message>
PCA with only lipoprotein main fractions
</commit_message>
<xml_diff>
--- a/Results.pptx
+++ b/Results.pptx
@@ -13,15 +13,18 @@
     <p:sldId id="268" r:id="rId7"/>
     <p:sldId id="269" r:id="rId8"/>
     <p:sldId id="270" r:id="rId9"/>
-    <p:sldId id="273" r:id="rId10"/>
-    <p:sldId id="274" r:id="rId11"/>
-    <p:sldId id="262" r:id="rId12"/>
-    <p:sldId id="257" r:id="rId13"/>
-    <p:sldId id="258" r:id="rId14"/>
-    <p:sldId id="259" r:id="rId15"/>
-    <p:sldId id="260" r:id="rId16"/>
-    <p:sldId id="271" r:id="rId17"/>
-    <p:sldId id="272" r:id="rId18"/>
+    <p:sldId id="275" r:id="rId10"/>
+    <p:sldId id="273" r:id="rId11"/>
+    <p:sldId id="274" r:id="rId12"/>
+    <p:sldId id="271" r:id="rId13"/>
+    <p:sldId id="272" r:id="rId14"/>
+    <p:sldId id="262" r:id="rId15"/>
+    <p:sldId id="257" r:id="rId16"/>
+    <p:sldId id="258" r:id="rId17"/>
+    <p:sldId id="259" r:id="rId18"/>
+    <p:sldId id="260" r:id="rId19"/>
+    <p:sldId id="276" r:id="rId20"/>
+    <p:sldId id="277" r:id="rId21"/>
   </p:sldIdLst>
   <p:sldSz cx="12192000" cy="6858000"/>
   <p:notesSz cx="6858000" cy="9144000"/>
@@ -120,6 +123,11 @@
       </a:defRPr>
     </a:lvl9pPr>
   </p:defaultTextStyle>
+  <p:extLst>
+    <p:ext uri="{EFAFB233-063F-42B5-8137-9DF3F51BA10A}">
+      <p15:sldGuideLst xmlns:p15="http://schemas.microsoft.com/office/powerpoint/2012/main"/>
+    </p:ext>
+  </p:extLst>
 </p:presentation>
 </file>
 
@@ -272,7 +280,7 @@
           <a:p>
             <a:fld id="{11841B7E-D9DB-4FF3-B314-935473DD573A}" type="datetimeFigureOut">
               <a:rPr lang="en-GB" smtClean="0"/>
-              <a:t>18/02/2021</a:t>
+              <a:t>19/02/2021</a:t>
             </a:fld>
             <a:endParaRPr lang="en-GB"/>
           </a:p>
@@ -472,7 +480,7 @@
           <a:p>
             <a:fld id="{11841B7E-D9DB-4FF3-B314-935473DD573A}" type="datetimeFigureOut">
               <a:rPr lang="en-GB" smtClean="0"/>
-              <a:t>18/02/2021</a:t>
+              <a:t>19/02/2021</a:t>
             </a:fld>
             <a:endParaRPr lang="en-GB"/>
           </a:p>
@@ -682,7 +690,7 @@
           <a:p>
             <a:fld id="{11841B7E-D9DB-4FF3-B314-935473DD573A}" type="datetimeFigureOut">
               <a:rPr lang="en-GB" smtClean="0"/>
-              <a:t>18/02/2021</a:t>
+              <a:t>19/02/2021</a:t>
             </a:fld>
             <a:endParaRPr lang="en-GB"/>
           </a:p>
@@ -882,7 +890,7 @@
           <a:p>
             <a:fld id="{11841B7E-D9DB-4FF3-B314-935473DD573A}" type="datetimeFigureOut">
               <a:rPr lang="en-GB" smtClean="0"/>
-              <a:t>18/02/2021</a:t>
+              <a:t>19/02/2021</a:t>
             </a:fld>
             <a:endParaRPr lang="en-GB"/>
           </a:p>
@@ -1158,7 +1166,7 @@
           <a:p>
             <a:fld id="{11841B7E-D9DB-4FF3-B314-935473DD573A}" type="datetimeFigureOut">
               <a:rPr lang="en-GB" smtClean="0"/>
-              <a:t>18/02/2021</a:t>
+              <a:t>19/02/2021</a:t>
             </a:fld>
             <a:endParaRPr lang="en-GB"/>
           </a:p>
@@ -1426,7 +1434,7 @@
           <a:p>
             <a:fld id="{11841B7E-D9DB-4FF3-B314-935473DD573A}" type="datetimeFigureOut">
               <a:rPr lang="en-GB" smtClean="0"/>
-              <a:t>18/02/2021</a:t>
+              <a:t>19/02/2021</a:t>
             </a:fld>
             <a:endParaRPr lang="en-GB"/>
           </a:p>
@@ -1841,7 +1849,7 @@
           <a:p>
             <a:fld id="{11841B7E-D9DB-4FF3-B314-935473DD573A}" type="datetimeFigureOut">
               <a:rPr lang="en-GB" smtClean="0"/>
-              <a:t>18/02/2021</a:t>
+              <a:t>19/02/2021</a:t>
             </a:fld>
             <a:endParaRPr lang="en-GB"/>
           </a:p>
@@ -1983,7 +1991,7 @@
           <a:p>
             <a:fld id="{11841B7E-D9DB-4FF3-B314-935473DD573A}" type="datetimeFigureOut">
               <a:rPr lang="en-GB" smtClean="0"/>
-              <a:t>18/02/2021</a:t>
+              <a:t>19/02/2021</a:t>
             </a:fld>
             <a:endParaRPr lang="en-GB"/>
           </a:p>
@@ -2096,7 +2104,7 @@
           <a:p>
             <a:fld id="{11841B7E-D9DB-4FF3-B314-935473DD573A}" type="datetimeFigureOut">
               <a:rPr lang="en-GB" smtClean="0"/>
-              <a:t>18/02/2021</a:t>
+              <a:t>19/02/2021</a:t>
             </a:fld>
             <a:endParaRPr lang="en-GB"/>
           </a:p>
@@ -2409,7 +2417,7 @@
           <a:p>
             <a:fld id="{11841B7E-D9DB-4FF3-B314-935473DD573A}" type="datetimeFigureOut">
               <a:rPr lang="en-GB" smtClean="0"/>
-              <a:t>18/02/2021</a:t>
+              <a:t>19/02/2021</a:t>
             </a:fld>
             <a:endParaRPr lang="en-GB"/>
           </a:p>
@@ -2698,7 +2706,7 @@
           <a:p>
             <a:fld id="{11841B7E-D9DB-4FF3-B314-935473DD573A}" type="datetimeFigureOut">
               <a:rPr lang="en-GB" smtClean="0"/>
-              <a:t>18/02/2021</a:t>
+              <a:t>19/02/2021</a:t>
             </a:fld>
             <a:endParaRPr lang="en-GB"/>
           </a:p>
@@ -2941,7 +2949,7 @@
           <a:p>
             <a:fld id="{11841B7E-D9DB-4FF3-B314-935473DD573A}" type="datetimeFigureOut">
               <a:rPr lang="en-GB" smtClean="0"/>
-              <a:t>18/02/2021</a:t>
+              <a:t>19/02/2021</a:t>
             </a:fld>
             <a:endParaRPr lang="en-GB"/>
           </a:p>
@@ -3451,6 +3459,118 @@
           <p:cNvPr id="2" name="Title 1">
             <a:extLst>
               <a:ext uri="{FF2B5EF4-FFF2-40B4-BE49-F238E27FC236}">
+                <a16:creationId xmlns:a16="http://schemas.microsoft.com/office/drawing/2014/main" id="{0E38578D-012D-4975-9925-7B7CE723501F}"/>
+              </a:ext>
+            </a:extLst>
+          </p:cNvPr>
+          <p:cNvSpPr>
+            <a:spLocks noGrp="1"/>
+          </p:cNvSpPr>
+          <p:nvPr>
+            <p:ph type="ctrTitle"/>
+          </p:nvPr>
+        </p:nvSpPr>
+        <p:spPr/>
+        <p:txBody>
+          <a:bodyPr/>
+          <a:lstStyle/>
+          <a:p>
+            <a:r>
+              <a:rPr lang="nl-NL" dirty="0" err="1"/>
+              <a:t>Wilcoxon</a:t>
+            </a:r>
+            <a:endParaRPr lang="en-GB" dirty="0"/>
+          </a:p>
+        </p:txBody>
+      </p:sp>
+      <p:sp>
+        <p:nvSpPr>
+          <p:cNvPr id="3" name="Subtitle 2">
+            <a:extLst>
+              <a:ext uri="{FF2B5EF4-FFF2-40B4-BE49-F238E27FC236}">
+                <a16:creationId xmlns:a16="http://schemas.microsoft.com/office/drawing/2014/main" id="{D4711863-5B31-485A-9E72-B4B3FD996FDB}"/>
+              </a:ext>
+            </a:extLst>
+          </p:cNvPr>
+          <p:cNvSpPr>
+            <a:spLocks noGrp="1"/>
+          </p:cNvSpPr>
+          <p:nvPr>
+            <p:ph type="subTitle" idx="1"/>
+          </p:nvPr>
+        </p:nvSpPr>
+        <p:spPr/>
+        <p:txBody>
+          <a:bodyPr/>
+          <a:lstStyle/>
+          <a:p>
+            <a:r>
+              <a:rPr lang="nl-NL" dirty="0" err="1"/>
+              <a:t>Only</a:t>
+            </a:r>
+            <a:r>
+              <a:rPr lang="nl-NL" dirty="0"/>
+              <a:t>: </a:t>
+            </a:r>
+            <a:r>
+              <a:rPr lang="nl-NL" dirty="0" err="1"/>
+              <a:t>Lipoprotein</a:t>
+            </a:r>
+            <a:r>
+              <a:rPr lang="nl-NL" dirty="0"/>
+              <a:t> </a:t>
+            </a:r>
+            <a:r>
+              <a:rPr lang="nl-NL" dirty="0" err="1"/>
+              <a:t>Main</a:t>
+            </a:r>
+            <a:r>
+              <a:rPr lang="nl-NL" dirty="0"/>
+              <a:t> </a:t>
+            </a:r>
+            <a:r>
+              <a:rPr lang="nl-NL" dirty="0" err="1"/>
+              <a:t>Fractions</a:t>
+            </a:r>
+            <a:endParaRPr lang="en-GB" dirty="0"/>
+          </a:p>
+        </p:txBody>
+      </p:sp>
+    </p:spTree>
+    <p:extLst>
+      <p:ext uri="{BB962C8B-B14F-4D97-AF65-F5344CB8AC3E}">
+        <p14:creationId xmlns:p14="http://schemas.microsoft.com/office/powerpoint/2010/main" val="2637551100"/>
+      </p:ext>
+    </p:extLst>
+  </p:cSld>
+  <p:clrMapOvr>
+    <a:masterClrMapping/>
+  </p:clrMapOvr>
+</p:sld>
+</file>
+
+<file path=ppt/slides/slide11.xml><?xml version="1.0" encoding="utf-8"?>
+<p:sld xmlns:a="http://schemas.openxmlformats.org/drawingml/2006/main" xmlns:r="http://schemas.openxmlformats.org/officeDocument/2006/relationships" xmlns:p="http://schemas.openxmlformats.org/presentationml/2006/main">
+  <p:cSld>
+    <p:spTree>
+      <p:nvGrpSpPr>
+        <p:cNvPr id="1" name=""/>
+        <p:cNvGrpSpPr/>
+        <p:nvPr/>
+      </p:nvGrpSpPr>
+      <p:grpSpPr>
+        <a:xfrm>
+          <a:off x="0" y="0"/>
+          <a:ext cx="0" cy="0"/>
+          <a:chOff x="0" y="0"/>
+          <a:chExt cx="0" cy="0"/>
+        </a:xfrm>
+      </p:grpSpPr>
+      <p:sp>
+        <p:nvSpPr>
+          <p:cNvPr id="2" name="Title 1">
+            <a:extLst>
+              <a:ext uri="{FF2B5EF4-FFF2-40B4-BE49-F238E27FC236}">
                 <a16:creationId xmlns:a16="http://schemas.microsoft.com/office/drawing/2014/main" id="{A4DBB473-F6C9-4D4D-9633-C365A2473601}"/>
               </a:ext>
             </a:extLst>
@@ -3539,7 +3659,7 @@
 </p:sld>
 </file>
 
-<file path=ppt/slides/slide11.xml><?xml version="1.0" encoding="utf-8"?>
+<file path=ppt/slides/slide12.xml><?xml version="1.0" encoding="utf-8"?>
 <p:sld xmlns:a="http://schemas.openxmlformats.org/drawingml/2006/main" xmlns:r="http://schemas.openxmlformats.org/officeDocument/2006/relationships" xmlns:p="http://schemas.openxmlformats.org/presentationml/2006/main">
   <p:cSld>
     <p:spTree>
@@ -3561,6 +3681,331 @@
           <p:cNvPr id="2" name="Title 1">
             <a:extLst>
               <a:ext uri="{FF2B5EF4-FFF2-40B4-BE49-F238E27FC236}">
+                <a16:creationId xmlns:a16="http://schemas.microsoft.com/office/drawing/2014/main" id="{F91311AA-6D9F-4C0F-A923-3C06389449F6}"/>
+              </a:ext>
+            </a:extLst>
+          </p:cNvPr>
+          <p:cNvSpPr>
+            <a:spLocks noGrp="1"/>
+          </p:cNvSpPr>
+          <p:nvPr>
+            <p:ph type="ctrTitle"/>
+          </p:nvPr>
+        </p:nvSpPr>
+        <p:spPr/>
+        <p:txBody>
+          <a:bodyPr/>
+          <a:lstStyle/>
+          <a:p>
+            <a:r>
+              <a:rPr lang="nl-NL" dirty="0"/>
+              <a:t>Random </a:t>
+            </a:r>
+            <a:r>
+              <a:rPr lang="nl-NL" dirty="0" err="1"/>
+              <a:t>Forest</a:t>
+            </a:r>
+            <a:endParaRPr lang="en-GB" dirty="0"/>
+          </a:p>
+        </p:txBody>
+      </p:sp>
+      <p:sp>
+        <p:nvSpPr>
+          <p:cNvPr id="3" name="Subtitle 2">
+            <a:extLst>
+              <a:ext uri="{FF2B5EF4-FFF2-40B4-BE49-F238E27FC236}">
+                <a16:creationId xmlns:a16="http://schemas.microsoft.com/office/drawing/2014/main" id="{BF796E3C-42F6-4383-AF5E-698EDE8C39B1}"/>
+              </a:ext>
+            </a:extLst>
+          </p:cNvPr>
+          <p:cNvSpPr>
+            <a:spLocks noGrp="1"/>
+          </p:cNvSpPr>
+          <p:nvPr>
+            <p:ph type="subTitle" idx="1"/>
+          </p:nvPr>
+        </p:nvSpPr>
+        <p:spPr/>
+        <p:txBody>
+          <a:bodyPr/>
+          <a:lstStyle/>
+          <a:p>
+            <a:r>
+              <a:rPr lang="nl-NL" dirty="0" err="1"/>
+              <a:t>Only</a:t>
+            </a:r>
+            <a:r>
+              <a:rPr lang="nl-NL" dirty="0"/>
+              <a:t> </a:t>
+            </a:r>
+            <a:r>
+              <a:rPr lang="nl-NL" dirty="0" err="1"/>
+              <a:t>Lipoprotein</a:t>
+            </a:r>
+            <a:r>
+              <a:rPr lang="nl-NL" dirty="0"/>
+              <a:t> </a:t>
+            </a:r>
+            <a:r>
+              <a:rPr lang="nl-NL" dirty="0" err="1"/>
+              <a:t>Main</a:t>
+            </a:r>
+            <a:r>
+              <a:rPr lang="nl-NL" dirty="0"/>
+              <a:t> </a:t>
+            </a:r>
+            <a:r>
+              <a:rPr lang="nl-NL" dirty="0" err="1"/>
+              <a:t>Fractions</a:t>
+            </a:r>
+            <a:endParaRPr lang="en-GB" dirty="0"/>
+          </a:p>
+        </p:txBody>
+      </p:sp>
+    </p:spTree>
+    <p:extLst>
+      <p:ext uri="{BB962C8B-B14F-4D97-AF65-F5344CB8AC3E}">
+        <p14:creationId xmlns:p14="http://schemas.microsoft.com/office/powerpoint/2010/main" val="2732764209"/>
+      </p:ext>
+    </p:extLst>
+  </p:cSld>
+  <p:clrMapOvr>
+    <a:masterClrMapping/>
+  </p:clrMapOvr>
+</p:sld>
+</file>
+
+<file path=ppt/slides/slide13.xml><?xml version="1.0" encoding="utf-8"?>
+<p:sld xmlns:a="http://schemas.openxmlformats.org/drawingml/2006/main" xmlns:r="http://schemas.openxmlformats.org/officeDocument/2006/relationships" xmlns:p="http://schemas.openxmlformats.org/presentationml/2006/main">
+  <p:cSld>
+    <p:spTree>
+      <p:nvGrpSpPr>
+        <p:cNvPr id="1" name=""/>
+        <p:cNvGrpSpPr/>
+        <p:nvPr/>
+      </p:nvGrpSpPr>
+      <p:grpSpPr>
+        <a:xfrm>
+          <a:off x="0" y="0"/>
+          <a:ext cx="0" cy="0"/>
+          <a:chOff x="0" y="0"/>
+          <a:chExt cx="0" cy="0"/>
+        </a:xfrm>
+      </p:grpSpPr>
+      <p:sp>
+        <p:nvSpPr>
+          <p:cNvPr id="2" name="Title 1">
+            <a:extLst>
+              <a:ext uri="{FF2B5EF4-FFF2-40B4-BE49-F238E27FC236}">
+                <a16:creationId xmlns:a16="http://schemas.microsoft.com/office/drawing/2014/main" id="{B32702EB-928A-45ED-A536-25B7A89F3B12}"/>
+              </a:ext>
+            </a:extLst>
+          </p:cNvPr>
+          <p:cNvSpPr>
+            <a:spLocks noGrp="1"/>
+          </p:cNvSpPr>
+          <p:nvPr>
+            <p:ph type="title"/>
+          </p:nvPr>
+        </p:nvSpPr>
+        <p:spPr/>
+        <p:txBody>
+          <a:bodyPr/>
+          <a:lstStyle/>
+          <a:p>
+            <a:pPr algn="ctr"/>
+            <a:r>
+              <a:rPr lang="nl-NL" dirty="0"/>
+              <a:t>Random </a:t>
+            </a:r>
+            <a:r>
+              <a:rPr lang="nl-NL" dirty="0" err="1"/>
+              <a:t>Forest</a:t>
+            </a:r>
+            <a:endParaRPr lang="en-GB" dirty="0"/>
+          </a:p>
+        </p:txBody>
+      </p:sp>
+      <p:sp>
+        <p:nvSpPr>
+          <p:cNvPr id="3" name="Content Placeholder 2">
+            <a:extLst>
+              <a:ext uri="{FF2B5EF4-FFF2-40B4-BE49-F238E27FC236}">
+                <a16:creationId xmlns:a16="http://schemas.microsoft.com/office/drawing/2014/main" id="{2CC461EF-BB81-4D3C-AD18-819545C6B1CD}"/>
+              </a:ext>
+            </a:extLst>
+          </p:cNvPr>
+          <p:cNvSpPr>
+            <a:spLocks noGrp="1"/>
+          </p:cNvSpPr>
+          <p:nvPr>
+            <p:ph idx="1"/>
+          </p:nvPr>
+        </p:nvSpPr>
+        <p:spPr/>
+        <p:txBody>
+          <a:bodyPr/>
+          <a:lstStyle/>
+          <a:p>
+            <a:endParaRPr lang="en-GB"/>
+          </a:p>
+        </p:txBody>
+      </p:sp>
+      <p:pic>
+        <p:nvPicPr>
+          <p:cNvPr id="5" name="Picture 4">
+            <a:extLst>
+              <a:ext uri="{FF2B5EF4-FFF2-40B4-BE49-F238E27FC236}">
+                <a16:creationId xmlns:a16="http://schemas.microsoft.com/office/drawing/2014/main" id="{976DC88E-6624-4631-A578-8198A0910B15}"/>
+              </a:ext>
+            </a:extLst>
+          </p:cNvPr>
+          <p:cNvPicPr>
+            <a:picLocks noChangeAspect="1"/>
+          </p:cNvPicPr>
+          <p:nvPr/>
+        </p:nvPicPr>
+        <p:blipFill>
+          <a:blip r:embed="rId2"/>
+          <a:stretch>
+            <a:fillRect/>
+          </a:stretch>
+        </p:blipFill>
+        <p:spPr>
+          <a:xfrm>
+            <a:off x="0" y="1530219"/>
+            <a:ext cx="5400000" cy="1581376"/>
+          </a:xfrm>
+          <a:prstGeom prst="rect">
+            <a:avLst/>
+          </a:prstGeom>
+        </p:spPr>
+      </p:pic>
+      <p:pic>
+        <p:nvPicPr>
+          <p:cNvPr id="7" name="Picture 6">
+            <a:extLst>
+              <a:ext uri="{FF2B5EF4-FFF2-40B4-BE49-F238E27FC236}">
+                <a16:creationId xmlns:a16="http://schemas.microsoft.com/office/drawing/2014/main" id="{2ECA9882-230F-4411-9B84-B92A1A0EC72F}"/>
+              </a:ext>
+            </a:extLst>
+          </p:cNvPr>
+          <p:cNvPicPr>
+            <a:picLocks noChangeAspect="1"/>
+          </p:cNvPicPr>
+          <p:nvPr/>
+        </p:nvPicPr>
+        <p:blipFill>
+          <a:blip r:embed="rId3"/>
+          <a:stretch>
+            <a:fillRect/>
+          </a:stretch>
+        </p:blipFill>
+        <p:spPr>
+          <a:xfrm>
+            <a:off x="6792000" y="1436492"/>
+            <a:ext cx="5400000" cy="1675103"/>
+          </a:xfrm>
+          <a:prstGeom prst="rect">
+            <a:avLst/>
+          </a:prstGeom>
+        </p:spPr>
+      </p:pic>
+      <p:pic>
+        <p:nvPicPr>
+          <p:cNvPr id="9" name="Picture 8">
+            <a:extLst>
+              <a:ext uri="{FF2B5EF4-FFF2-40B4-BE49-F238E27FC236}">
+                <a16:creationId xmlns:a16="http://schemas.microsoft.com/office/drawing/2014/main" id="{7C6D8E62-A83C-48A1-9226-9FAB6C636388}"/>
+              </a:ext>
+            </a:extLst>
+          </p:cNvPr>
+          <p:cNvPicPr>
+            <a:picLocks noChangeAspect="1"/>
+          </p:cNvPicPr>
+          <p:nvPr/>
+        </p:nvPicPr>
+        <p:blipFill>
+          <a:blip r:embed="rId4"/>
+          <a:stretch>
+            <a:fillRect/>
+          </a:stretch>
+        </p:blipFill>
+        <p:spPr>
+          <a:xfrm>
+            <a:off x="0" y="3938849"/>
+            <a:ext cx="5400000" cy="1865455"/>
+          </a:xfrm>
+          <a:prstGeom prst="rect">
+            <a:avLst/>
+          </a:prstGeom>
+        </p:spPr>
+      </p:pic>
+      <p:pic>
+        <p:nvPicPr>
+          <p:cNvPr id="11" name="Picture 10">
+            <a:extLst>
+              <a:ext uri="{FF2B5EF4-FFF2-40B4-BE49-F238E27FC236}">
+                <a16:creationId xmlns:a16="http://schemas.microsoft.com/office/drawing/2014/main" id="{2FA86100-14E6-4727-BF31-3DC65F6D1A8F}"/>
+              </a:ext>
+            </a:extLst>
+          </p:cNvPr>
+          <p:cNvPicPr>
+            <a:picLocks noChangeAspect="1"/>
+          </p:cNvPicPr>
+          <p:nvPr/>
+        </p:nvPicPr>
+        <p:blipFill>
+          <a:blip r:embed="rId5"/>
+          <a:stretch>
+            <a:fillRect/>
+          </a:stretch>
+        </p:blipFill>
+        <p:spPr>
+          <a:xfrm>
+            <a:off x="6792000" y="4126127"/>
+            <a:ext cx="5400000" cy="1678177"/>
+          </a:xfrm>
+          <a:prstGeom prst="rect">
+            <a:avLst/>
+          </a:prstGeom>
+        </p:spPr>
+      </p:pic>
+    </p:spTree>
+    <p:extLst>
+      <p:ext uri="{BB962C8B-B14F-4D97-AF65-F5344CB8AC3E}">
+        <p14:creationId xmlns:p14="http://schemas.microsoft.com/office/powerpoint/2010/main" val="1899961975"/>
+      </p:ext>
+    </p:extLst>
+  </p:cSld>
+  <p:clrMapOvr>
+    <a:masterClrMapping/>
+  </p:clrMapOvr>
+</p:sld>
+</file>
+
+<file path=ppt/slides/slide14.xml><?xml version="1.0" encoding="utf-8"?>
+<p:sld xmlns:a="http://schemas.openxmlformats.org/drawingml/2006/main" xmlns:r="http://schemas.openxmlformats.org/officeDocument/2006/relationships" xmlns:p="http://schemas.openxmlformats.org/presentationml/2006/main">
+  <p:cSld>
+    <p:spTree>
+      <p:nvGrpSpPr>
+        <p:cNvPr id="1" name=""/>
+        <p:cNvGrpSpPr/>
+        <p:nvPr/>
+      </p:nvGrpSpPr>
+      <p:grpSpPr>
+        <a:xfrm>
+          <a:off x="0" y="0"/>
+          <a:ext cx="0" cy="0"/>
+          <a:chOff x="0" y="0"/>
+          <a:chExt cx="0" cy="0"/>
+        </a:xfrm>
+      </p:grpSpPr>
+      <p:sp>
+        <p:nvSpPr>
+          <p:cNvPr id="2" name="Title 1">
+            <a:extLst>
+              <a:ext uri="{FF2B5EF4-FFF2-40B4-BE49-F238E27FC236}">
                 <a16:creationId xmlns:a16="http://schemas.microsoft.com/office/drawing/2014/main" id="{F160B8E8-41A5-40C6-8851-99D34325CED8}"/>
               </a:ext>
             </a:extLst>
@@ -3610,7 +4055,35 @@
           <a:bodyPr/>
           <a:lstStyle/>
           <a:p>
-            <a:endParaRPr lang="en-GB"/>
+            <a:r>
+              <a:rPr lang="nl-NL" dirty="0" err="1"/>
+              <a:t>Only</a:t>
+            </a:r>
+            <a:r>
+              <a:rPr lang="nl-NL" dirty="0"/>
+              <a:t>: </a:t>
+            </a:r>
+            <a:r>
+              <a:rPr lang="nl-NL" dirty="0" err="1"/>
+              <a:t>Lipoprotein</a:t>
+            </a:r>
+            <a:r>
+              <a:rPr lang="nl-NL" dirty="0"/>
+              <a:t> </a:t>
+            </a:r>
+            <a:r>
+              <a:rPr lang="nl-NL" dirty="0" err="1"/>
+              <a:t>Main</a:t>
+            </a:r>
+            <a:r>
+              <a:rPr lang="nl-NL" dirty="0"/>
+              <a:t> </a:t>
+            </a:r>
+            <a:r>
+              <a:rPr lang="nl-NL" dirty="0" err="1"/>
+              <a:t>Fractions</a:t>
+            </a:r>
+            <a:endParaRPr lang="en-GB" dirty="0"/>
           </a:p>
         </p:txBody>
       </p:sp>
@@ -3627,7 +4100,7 @@
 </p:sld>
 </file>
 
-<file path=ppt/slides/slide12.xml><?xml version="1.0" encoding="utf-8"?>
+<file path=ppt/slides/slide15.xml><?xml version="1.0" encoding="utf-8"?>
 <p:sld xmlns:a="http://schemas.openxmlformats.org/drawingml/2006/main" xmlns:r="http://schemas.openxmlformats.org/officeDocument/2006/relationships" xmlns:p="http://schemas.openxmlformats.org/presentationml/2006/main">
   <p:cSld>
     <p:spTree>
@@ -3745,7 +4218,7 @@
 </p:sld>
 </file>
 
-<file path=ppt/slides/slide13.xml><?xml version="1.0" encoding="utf-8"?>
+<file path=ppt/slides/slide16.xml><?xml version="1.0" encoding="utf-8"?>
 <p:sld xmlns:a="http://schemas.openxmlformats.org/drawingml/2006/main" xmlns:r="http://schemas.openxmlformats.org/officeDocument/2006/relationships" xmlns:p="http://schemas.openxmlformats.org/presentationml/2006/main">
   <p:cSld>
     <p:spTree>
@@ -3859,7 +4332,7 @@
 </p:sld>
 </file>
 
-<file path=ppt/slides/slide14.xml><?xml version="1.0" encoding="utf-8"?>
+<file path=ppt/slides/slide17.xml><?xml version="1.0" encoding="utf-8"?>
 <p:sld xmlns:a="http://schemas.openxmlformats.org/drawingml/2006/main" xmlns:r="http://schemas.openxmlformats.org/officeDocument/2006/relationships" xmlns:p="http://schemas.openxmlformats.org/presentationml/2006/main">
   <p:cSld>
     <p:spTree>
@@ -3973,7 +4446,7 @@
 </p:sld>
 </file>
 
-<file path=ppt/slides/slide15.xml><?xml version="1.0" encoding="utf-8"?>
+<file path=ppt/slides/slide18.xml><?xml version="1.0" encoding="utf-8"?>
 <p:sld xmlns:a="http://schemas.openxmlformats.org/drawingml/2006/main" xmlns:r="http://schemas.openxmlformats.org/officeDocument/2006/relationships" xmlns:p="http://schemas.openxmlformats.org/presentationml/2006/main">
   <p:cSld>
     <p:spTree>
@@ -4099,7 +4572,7 @@
 </p:sld>
 </file>
 
-<file path=ppt/slides/slide16.xml><?xml version="1.0" encoding="utf-8"?>
+<file path=ppt/slides/slide19.xml><?xml version="1.0" encoding="utf-8"?>
 <p:sld xmlns:a="http://schemas.openxmlformats.org/drawingml/2006/main" xmlns:r="http://schemas.openxmlformats.org/officeDocument/2006/relationships" xmlns:p="http://schemas.openxmlformats.org/presentationml/2006/main">
   <p:cSld>
     <p:spTree>
@@ -4121,7 +4594,7 @@
           <p:cNvPr id="2" name="Title 1">
             <a:extLst>
               <a:ext uri="{FF2B5EF4-FFF2-40B4-BE49-F238E27FC236}">
-                <a16:creationId xmlns:a16="http://schemas.microsoft.com/office/drawing/2014/main" id="{F91311AA-6D9F-4C0F-A923-3C06389449F6}"/>
+                <a16:creationId xmlns:a16="http://schemas.microsoft.com/office/drawing/2014/main" id="{FB291AE7-6B3E-4893-B6DB-3173E79F298B}"/>
               </a:ext>
             </a:extLst>
           </p:cNvPr>
@@ -4139,254 +4612,69 @@
           <a:p>
             <a:r>
               <a:rPr lang="nl-NL" dirty="0"/>
-              <a:t>Random </a:t>
-            </a:r>
+              <a:t>COVSCA</a:t>
+            </a:r>
+            <a:endParaRPr lang="en-GB" dirty="0"/>
+          </a:p>
+        </p:txBody>
+      </p:sp>
+      <p:sp>
+        <p:nvSpPr>
+          <p:cNvPr id="3" name="Subtitle 2">
+            <a:extLst>
+              <a:ext uri="{FF2B5EF4-FFF2-40B4-BE49-F238E27FC236}">
+                <a16:creationId xmlns:a16="http://schemas.microsoft.com/office/drawing/2014/main" id="{7BEE05D5-A717-444F-BBFF-721E19368E52}"/>
+              </a:ext>
+            </a:extLst>
+          </p:cNvPr>
+          <p:cNvSpPr>
+            <a:spLocks noGrp="1"/>
+          </p:cNvSpPr>
+          <p:nvPr>
+            <p:ph type="subTitle" idx="1"/>
+          </p:nvPr>
+        </p:nvSpPr>
+        <p:spPr/>
+        <p:txBody>
+          <a:bodyPr/>
+          <a:lstStyle/>
+          <a:p>
             <a:r>
               <a:rPr lang="nl-NL" dirty="0" err="1"/>
-              <a:t>Forest</a:t>
+              <a:t>Only</a:t>
+            </a:r>
+            <a:r>
+              <a:rPr lang="nl-NL" dirty="0"/>
+              <a:t> </a:t>
+            </a:r>
+            <a:r>
+              <a:rPr lang="nl-NL" dirty="0" err="1"/>
+              <a:t>Lipoprotein</a:t>
+            </a:r>
+            <a:r>
+              <a:rPr lang="nl-NL" dirty="0"/>
+              <a:t> </a:t>
+            </a:r>
+            <a:r>
+              <a:rPr lang="nl-NL" dirty="0" err="1"/>
+              <a:t>Main</a:t>
+            </a:r>
+            <a:r>
+              <a:rPr lang="nl-NL" dirty="0"/>
+              <a:t> </a:t>
+            </a:r>
+            <a:r>
+              <a:rPr lang="nl-NL" dirty="0" err="1"/>
+              <a:t>Fractions</a:t>
             </a:r>
             <a:endParaRPr lang="en-GB" dirty="0"/>
-          </a:p>
-        </p:txBody>
-      </p:sp>
-      <p:sp>
-        <p:nvSpPr>
-          <p:cNvPr id="3" name="Subtitle 2">
-            <a:extLst>
-              <a:ext uri="{FF2B5EF4-FFF2-40B4-BE49-F238E27FC236}">
-                <a16:creationId xmlns:a16="http://schemas.microsoft.com/office/drawing/2014/main" id="{BF796E3C-42F6-4383-AF5E-698EDE8C39B1}"/>
-              </a:ext>
-            </a:extLst>
-          </p:cNvPr>
-          <p:cNvSpPr>
-            <a:spLocks noGrp="1"/>
-          </p:cNvSpPr>
-          <p:nvPr>
-            <p:ph type="subTitle" idx="1"/>
-          </p:nvPr>
-        </p:nvSpPr>
-        <p:spPr/>
-        <p:txBody>
-          <a:bodyPr/>
-          <a:lstStyle/>
-          <a:p>
-            <a:endParaRPr lang="en-GB"/>
           </a:p>
         </p:txBody>
       </p:sp>
     </p:spTree>
     <p:extLst>
       <p:ext uri="{BB962C8B-B14F-4D97-AF65-F5344CB8AC3E}">
-        <p14:creationId xmlns:p14="http://schemas.microsoft.com/office/powerpoint/2010/main" val="2732764209"/>
-      </p:ext>
-    </p:extLst>
-  </p:cSld>
-  <p:clrMapOvr>
-    <a:masterClrMapping/>
-  </p:clrMapOvr>
-</p:sld>
-</file>
-
-<file path=ppt/slides/slide17.xml><?xml version="1.0" encoding="utf-8"?>
-<p:sld xmlns:a="http://schemas.openxmlformats.org/drawingml/2006/main" xmlns:r="http://schemas.openxmlformats.org/officeDocument/2006/relationships" xmlns:p="http://schemas.openxmlformats.org/presentationml/2006/main">
-  <p:cSld>
-    <p:spTree>
-      <p:nvGrpSpPr>
-        <p:cNvPr id="1" name=""/>
-        <p:cNvGrpSpPr/>
-        <p:nvPr/>
-      </p:nvGrpSpPr>
-      <p:grpSpPr>
-        <a:xfrm>
-          <a:off x="0" y="0"/>
-          <a:ext cx="0" cy="0"/>
-          <a:chOff x="0" y="0"/>
-          <a:chExt cx="0" cy="0"/>
-        </a:xfrm>
-      </p:grpSpPr>
-      <p:sp>
-        <p:nvSpPr>
-          <p:cNvPr id="2" name="Title 1">
-            <a:extLst>
-              <a:ext uri="{FF2B5EF4-FFF2-40B4-BE49-F238E27FC236}">
-                <a16:creationId xmlns:a16="http://schemas.microsoft.com/office/drawing/2014/main" id="{B32702EB-928A-45ED-A536-25B7A89F3B12}"/>
-              </a:ext>
-            </a:extLst>
-          </p:cNvPr>
-          <p:cNvSpPr>
-            <a:spLocks noGrp="1"/>
-          </p:cNvSpPr>
-          <p:nvPr>
-            <p:ph type="title"/>
-          </p:nvPr>
-        </p:nvSpPr>
-        <p:spPr/>
-        <p:txBody>
-          <a:bodyPr/>
-          <a:lstStyle/>
-          <a:p>
-            <a:pPr algn="ctr"/>
-            <a:r>
-              <a:rPr lang="nl-NL" dirty="0"/>
-              <a:t>Random </a:t>
-            </a:r>
-            <a:r>
-              <a:rPr lang="nl-NL" dirty="0" err="1"/>
-              <a:t>Forest</a:t>
-            </a:r>
-            <a:endParaRPr lang="en-GB" dirty="0"/>
-          </a:p>
-        </p:txBody>
-      </p:sp>
-      <p:sp>
-        <p:nvSpPr>
-          <p:cNvPr id="3" name="Content Placeholder 2">
-            <a:extLst>
-              <a:ext uri="{FF2B5EF4-FFF2-40B4-BE49-F238E27FC236}">
-                <a16:creationId xmlns:a16="http://schemas.microsoft.com/office/drawing/2014/main" id="{2CC461EF-BB81-4D3C-AD18-819545C6B1CD}"/>
-              </a:ext>
-            </a:extLst>
-          </p:cNvPr>
-          <p:cNvSpPr>
-            <a:spLocks noGrp="1"/>
-          </p:cNvSpPr>
-          <p:nvPr>
-            <p:ph idx="1"/>
-          </p:nvPr>
-        </p:nvSpPr>
-        <p:spPr/>
-        <p:txBody>
-          <a:bodyPr/>
-          <a:lstStyle/>
-          <a:p>
-            <a:endParaRPr lang="en-GB"/>
-          </a:p>
-        </p:txBody>
-      </p:sp>
-      <p:pic>
-        <p:nvPicPr>
-          <p:cNvPr id="5" name="Picture 4">
-            <a:extLst>
-              <a:ext uri="{FF2B5EF4-FFF2-40B4-BE49-F238E27FC236}">
-                <a16:creationId xmlns:a16="http://schemas.microsoft.com/office/drawing/2014/main" id="{976DC88E-6624-4631-A578-8198A0910B15}"/>
-              </a:ext>
-            </a:extLst>
-          </p:cNvPr>
-          <p:cNvPicPr>
-            <a:picLocks noChangeAspect="1"/>
-          </p:cNvPicPr>
-          <p:nvPr/>
-        </p:nvPicPr>
-        <p:blipFill>
-          <a:blip r:embed="rId2"/>
-          <a:stretch>
-            <a:fillRect/>
-          </a:stretch>
-        </p:blipFill>
-        <p:spPr>
-          <a:xfrm>
-            <a:off x="0" y="1530219"/>
-            <a:ext cx="5400000" cy="1581376"/>
-          </a:xfrm>
-          <a:prstGeom prst="rect">
-            <a:avLst/>
-          </a:prstGeom>
-        </p:spPr>
-      </p:pic>
-      <p:pic>
-        <p:nvPicPr>
-          <p:cNvPr id="7" name="Picture 6">
-            <a:extLst>
-              <a:ext uri="{FF2B5EF4-FFF2-40B4-BE49-F238E27FC236}">
-                <a16:creationId xmlns:a16="http://schemas.microsoft.com/office/drawing/2014/main" id="{2ECA9882-230F-4411-9B84-B92A1A0EC72F}"/>
-              </a:ext>
-            </a:extLst>
-          </p:cNvPr>
-          <p:cNvPicPr>
-            <a:picLocks noChangeAspect="1"/>
-          </p:cNvPicPr>
-          <p:nvPr/>
-        </p:nvPicPr>
-        <p:blipFill>
-          <a:blip r:embed="rId3"/>
-          <a:stretch>
-            <a:fillRect/>
-          </a:stretch>
-        </p:blipFill>
-        <p:spPr>
-          <a:xfrm>
-            <a:off x="6792000" y="1436492"/>
-            <a:ext cx="5400000" cy="1675103"/>
-          </a:xfrm>
-          <a:prstGeom prst="rect">
-            <a:avLst/>
-          </a:prstGeom>
-        </p:spPr>
-      </p:pic>
-      <p:pic>
-        <p:nvPicPr>
-          <p:cNvPr id="9" name="Picture 8">
-            <a:extLst>
-              <a:ext uri="{FF2B5EF4-FFF2-40B4-BE49-F238E27FC236}">
-                <a16:creationId xmlns:a16="http://schemas.microsoft.com/office/drawing/2014/main" id="{7C6D8E62-A83C-48A1-9226-9FAB6C636388}"/>
-              </a:ext>
-            </a:extLst>
-          </p:cNvPr>
-          <p:cNvPicPr>
-            <a:picLocks noChangeAspect="1"/>
-          </p:cNvPicPr>
-          <p:nvPr/>
-        </p:nvPicPr>
-        <p:blipFill>
-          <a:blip r:embed="rId4"/>
-          <a:stretch>
-            <a:fillRect/>
-          </a:stretch>
-        </p:blipFill>
-        <p:spPr>
-          <a:xfrm>
-            <a:off x="0" y="3938849"/>
-            <a:ext cx="5400000" cy="1865455"/>
-          </a:xfrm>
-          <a:prstGeom prst="rect">
-            <a:avLst/>
-          </a:prstGeom>
-        </p:spPr>
-      </p:pic>
-      <p:pic>
-        <p:nvPicPr>
-          <p:cNvPr id="11" name="Picture 10">
-            <a:extLst>
-              <a:ext uri="{FF2B5EF4-FFF2-40B4-BE49-F238E27FC236}">
-                <a16:creationId xmlns:a16="http://schemas.microsoft.com/office/drawing/2014/main" id="{2FA86100-14E6-4727-BF31-3DC65F6D1A8F}"/>
-              </a:ext>
-            </a:extLst>
-          </p:cNvPr>
-          <p:cNvPicPr>
-            <a:picLocks noChangeAspect="1"/>
-          </p:cNvPicPr>
-          <p:nvPr/>
-        </p:nvPicPr>
-        <p:blipFill>
-          <a:blip r:embed="rId5"/>
-          <a:stretch>
-            <a:fillRect/>
-          </a:stretch>
-        </p:blipFill>
-        <p:spPr>
-          <a:xfrm>
-            <a:off x="6792000" y="4126127"/>
-            <a:ext cx="5400000" cy="1678177"/>
-          </a:xfrm>
-          <a:prstGeom prst="rect">
-            <a:avLst/>
-          </a:prstGeom>
-        </p:spPr>
-      </p:pic>
-    </p:spTree>
-    <p:extLst>
-      <p:ext uri="{BB962C8B-B14F-4D97-AF65-F5344CB8AC3E}">
-        <p14:creationId xmlns:p14="http://schemas.microsoft.com/office/powerpoint/2010/main" val="1899961975"/>
+        <p14:creationId xmlns:p14="http://schemas.microsoft.com/office/powerpoint/2010/main" val="1156986223"/>
       </p:ext>
     </p:extLst>
   </p:cSld>
@@ -4513,6 +4801,116 @@
     <p:extLst>
       <p:ext uri="{BB962C8B-B14F-4D97-AF65-F5344CB8AC3E}">
         <p14:creationId xmlns:p14="http://schemas.microsoft.com/office/powerpoint/2010/main" val="836000896"/>
+      </p:ext>
+    </p:extLst>
+  </p:cSld>
+  <p:clrMapOvr>
+    <a:masterClrMapping/>
+  </p:clrMapOvr>
+</p:sld>
+</file>
+
+<file path=ppt/slides/slide20.xml><?xml version="1.0" encoding="utf-8"?>
+<p:sld xmlns:a="http://schemas.openxmlformats.org/drawingml/2006/main" xmlns:r="http://schemas.openxmlformats.org/officeDocument/2006/relationships" xmlns:p="http://schemas.openxmlformats.org/presentationml/2006/main">
+  <p:cSld>
+    <p:spTree>
+      <p:nvGrpSpPr>
+        <p:cNvPr id="1" name=""/>
+        <p:cNvGrpSpPr/>
+        <p:nvPr/>
+      </p:nvGrpSpPr>
+      <p:grpSpPr>
+        <a:xfrm>
+          <a:off x="0" y="0"/>
+          <a:ext cx="0" cy="0"/>
+          <a:chOff x="0" y="0"/>
+          <a:chExt cx="0" cy="0"/>
+        </a:xfrm>
+      </p:grpSpPr>
+      <p:sp>
+        <p:nvSpPr>
+          <p:cNvPr id="2" name="Title 1">
+            <a:extLst>
+              <a:ext uri="{FF2B5EF4-FFF2-40B4-BE49-F238E27FC236}">
+                <a16:creationId xmlns:a16="http://schemas.microsoft.com/office/drawing/2014/main" id="{712D02E1-62D8-4060-A127-7FB5DB7260D3}"/>
+              </a:ext>
+            </a:extLst>
+          </p:cNvPr>
+          <p:cNvSpPr>
+            <a:spLocks noGrp="1"/>
+          </p:cNvSpPr>
+          <p:nvPr>
+            <p:ph type="title"/>
+          </p:nvPr>
+        </p:nvSpPr>
+        <p:spPr/>
+        <p:txBody>
+          <a:bodyPr/>
+          <a:lstStyle/>
+          <a:p>
+            <a:endParaRPr lang="en-GB"/>
+          </a:p>
+        </p:txBody>
+      </p:sp>
+      <p:sp>
+        <p:nvSpPr>
+          <p:cNvPr id="3" name="Content Placeholder 2">
+            <a:extLst>
+              <a:ext uri="{FF2B5EF4-FFF2-40B4-BE49-F238E27FC236}">
+                <a16:creationId xmlns:a16="http://schemas.microsoft.com/office/drawing/2014/main" id="{36BF2B10-4382-439F-AD45-C437FEFCD091}"/>
+              </a:ext>
+            </a:extLst>
+          </p:cNvPr>
+          <p:cNvSpPr>
+            <a:spLocks noGrp="1"/>
+          </p:cNvSpPr>
+          <p:nvPr>
+            <p:ph idx="1"/>
+          </p:nvPr>
+        </p:nvSpPr>
+        <p:spPr/>
+        <p:txBody>
+          <a:bodyPr/>
+          <a:lstStyle/>
+          <a:p>
+            <a:endParaRPr lang="en-GB"/>
+          </a:p>
+        </p:txBody>
+      </p:sp>
+      <p:pic>
+        <p:nvPicPr>
+          <p:cNvPr id="5" name="Picture 4">
+            <a:extLst>
+              <a:ext uri="{FF2B5EF4-FFF2-40B4-BE49-F238E27FC236}">
+                <a16:creationId xmlns:a16="http://schemas.microsoft.com/office/drawing/2014/main" id="{FCAC08E3-F7C1-43DE-9EA9-E76FED33A1B8}"/>
+              </a:ext>
+            </a:extLst>
+          </p:cNvPr>
+          <p:cNvPicPr>
+            <a:picLocks noChangeAspect="1"/>
+          </p:cNvPicPr>
+          <p:nvPr/>
+        </p:nvPicPr>
+        <p:blipFill>
+          <a:blip r:embed="rId2"/>
+          <a:stretch>
+            <a:fillRect/>
+          </a:stretch>
+        </p:blipFill>
+        <p:spPr>
+          <a:xfrm>
+            <a:off x="2338387" y="366712"/>
+            <a:ext cx="7515225" cy="6124575"/>
+          </a:xfrm>
+          <a:prstGeom prst="rect">
+            <a:avLst/>
+          </a:prstGeom>
+        </p:spPr>
+      </p:pic>
+    </p:spTree>
+    <p:extLst>
+      <p:ext uri="{BB962C8B-B14F-4D97-AF65-F5344CB8AC3E}">
+        <p14:creationId xmlns:p14="http://schemas.microsoft.com/office/powerpoint/2010/main" val="1139815667"/>
       </p:ext>
     </p:extLst>
   </p:cSld>
@@ -5317,7 +5715,15 @@
             <a:pPr algn="ctr"/>
             <a:r>
               <a:rPr lang="nl-NL" dirty="0"/>
-              <a:t>PCA</a:t>
+              <a:t>PCA (</a:t>
+            </a:r>
+            <a:r>
+              <a:rPr lang="nl-NL" dirty="0" err="1"/>
+              <a:t>all</a:t>
+            </a:r>
+            <a:r>
+              <a:rPr lang="nl-NL" dirty="0"/>
+              <a:t> data)</a:t>
             </a:r>
             <a:endParaRPr lang="en-GB" dirty="0"/>
           </a:p>
@@ -5473,25 +5879,58 @@
           <p:cNvPr id="2" name="Title 1">
             <a:extLst>
               <a:ext uri="{FF2B5EF4-FFF2-40B4-BE49-F238E27FC236}">
-                <a16:creationId xmlns:a16="http://schemas.microsoft.com/office/drawing/2014/main" id="{0E38578D-012D-4975-9925-7B7CE723501F}"/>
-              </a:ext>
-            </a:extLst>
-          </p:cNvPr>
-          <p:cNvSpPr>
-            <a:spLocks noGrp="1"/>
-          </p:cNvSpPr>
-          <p:nvPr>
-            <p:ph type="ctrTitle"/>
-          </p:nvPr>
-        </p:nvSpPr>
-        <p:spPr/>
-        <p:txBody>
-          <a:bodyPr/>
-          <a:lstStyle/>
-          <a:p>
+                <a16:creationId xmlns:a16="http://schemas.microsoft.com/office/drawing/2014/main" id="{451496A1-84FE-49B7-BCAF-B2BC121BA19E}"/>
+              </a:ext>
+            </a:extLst>
+          </p:cNvPr>
+          <p:cNvSpPr>
+            <a:spLocks noGrp="1"/>
+          </p:cNvSpPr>
+          <p:nvPr>
+            <p:ph type="title"/>
+          </p:nvPr>
+        </p:nvSpPr>
+        <p:spPr/>
+        <p:txBody>
+          <a:bodyPr/>
+          <a:lstStyle/>
+          <a:p>
+            <a:pPr algn="ctr"/>
+            <a:r>
+              <a:rPr lang="nl-NL" dirty="0"/>
+              <a:t>PCA (</a:t>
+            </a:r>
             <a:r>
               <a:rPr lang="nl-NL" dirty="0" err="1"/>
-              <a:t>Wilcoxon</a:t>
+              <a:t>only</a:t>
+            </a:r>
+            <a:r>
+              <a:rPr lang="nl-NL" dirty="0"/>
+              <a:t> </a:t>
+            </a:r>
+            <a:r>
+              <a:rPr lang="nl-NL" dirty="0" err="1"/>
+              <a:t>Lipoprotein</a:t>
+            </a:r>
+            <a:r>
+              <a:rPr lang="nl-NL" dirty="0"/>
+              <a:t> </a:t>
+            </a:r>
+            <a:r>
+              <a:rPr lang="nl-NL" dirty="0" err="1"/>
+              <a:t>Main</a:t>
+            </a:r>
+            <a:r>
+              <a:rPr lang="nl-NL" dirty="0"/>
+              <a:t> </a:t>
+            </a:r>
+            <a:r>
+              <a:rPr lang="nl-NL" dirty="0" err="1"/>
+              <a:t>Fractions</a:t>
+            </a:r>
+            <a:r>
+              <a:rPr lang="nl-NL" dirty="0"/>
+              <a:t>)</a:t>
             </a:r>
             <a:endParaRPr lang="en-GB" dirty="0"/>
           </a:p>
@@ -5499,33 +5938,138 @@
       </p:sp>
       <p:sp>
         <p:nvSpPr>
-          <p:cNvPr id="3" name="Subtitle 2">
-            <a:extLst>
-              <a:ext uri="{FF2B5EF4-FFF2-40B4-BE49-F238E27FC236}">
-                <a16:creationId xmlns:a16="http://schemas.microsoft.com/office/drawing/2014/main" id="{D4711863-5B31-485A-9E72-B4B3FD996FDB}"/>
-              </a:ext>
-            </a:extLst>
-          </p:cNvPr>
-          <p:cNvSpPr>
-            <a:spLocks noGrp="1"/>
-          </p:cNvSpPr>
-          <p:nvPr>
-            <p:ph type="subTitle" idx="1"/>
-          </p:nvPr>
-        </p:nvSpPr>
-        <p:spPr/>
-        <p:txBody>
-          <a:bodyPr/>
-          <a:lstStyle/>
-          <a:p>
-            <a:endParaRPr lang="en-GB"/>
-          </a:p>
-        </p:txBody>
-      </p:sp>
+          <p:cNvPr id="3" name="Content Placeholder 2">
+            <a:extLst>
+              <a:ext uri="{FF2B5EF4-FFF2-40B4-BE49-F238E27FC236}">
+                <a16:creationId xmlns:a16="http://schemas.microsoft.com/office/drawing/2014/main" id="{36E84A6C-4472-4396-A4D5-1AB7E31A9FD5}"/>
+              </a:ext>
+            </a:extLst>
+          </p:cNvPr>
+          <p:cNvSpPr>
+            <a:spLocks noGrp="1"/>
+          </p:cNvSpPr>
+          <p:nvPr>
+            <p:ph idx="1"/>
+          </p:nvPr>
+        </p:nvSpPr>
+        <p:spPr/>
+        <p:txBody>
+          <a:bodyPr/>
+          <a:lstStyle/>
+          <a:p>
+            <a:endParaRPr lang="en-GB"/>
+          </a:p>
+        </p:txBody>
+      </p:sp>
+      <p:pic>
+        <p:nvPicPr>
+          <p:cNvPr id="5" name="Picture 4">
+            <a:extLst>
+              <a:ext uri="{FF2B5EF4-FFF2-40B4-BE49-F238E27FC236}">
+                <a16:creationId xmlns:a16="http://schemas.microsoft.com/office/drawing/2014/main" id="{9D21215D-A1D9-42F4-BC6F-3AA045147DE0}"/>
+              </a:ext>
+            </a:extLst>
+          </p:cNvPr>
+          <p:cNvPicPr>
+            <a:picLocks noChangeAspect="1"/>
+          </p:cNvPicPr>
+          <p:nvPr/>
+        </p:nvPicPr>
+        <p:blipFill>
+          <a:blip r:embed="rId2">
+            <a:extLst>
+              <a:ext uri="{28A0092B-C50C-407E-A947-70E740481C1C}">
+                <a14:useLocalDpi xmlns:a14="http://schemas.microsoft.com/office/drawing/2010/main" val="0"/>
+              </a:ext>
+            </a:extLst>
+          </a:blip>
+          <a:srcRect/>
+          <a:stretch/>
+        </p:blipFill>
+        <p:spPr>
+          <a:xfrm>
+            <a:off x="0" y="1708370"/>
+            <a:ext cx="3600000" cy="3441259"/>
+          </a:xfrm>
+          <a:prstGeom prst="rect">
+            <a:avLst/>
+          </a:prstGeom>
+        </p:spPr>
+      </p:pic>
+      <p:pic>
+        <p:nvPicPr>
+          <p:cNvPr id="7" name="Picture 6">
+            <a:extLst>
+              <a:ext uri="{FF2B5EF4-FFF2-40B4-BE49-F238E27FC236}">
+                <a16:creationId xmlns:a16="http://schemas.microsoft.com/office/drawing/2014/main" id="{1E8521D3-EB0B-46FB-89ED-6685B943C983}"/>
+              </a:ext>
+            </a:extLst>
+          </p:cNvPr>
+          <p:cNvPicPr>
+            <a:picLocks noChangeAspect="1"/>
+          </p:cNvPicPr>
+          <p:nvPr/>
+        </p:nvPicPr>
+        <p:blipFill>
+          <a:blip r:embed="rId3">
+            <a:extLst>
+              <a:ext uri="{28A0092B-C50C-407E-A947-70E740481C1C}">
+                <a14:useLocalDpi xmlns:a14="http://schemas.microsoft.com/office/drawing/2010/main" val="0"/>
+              </a:ext>
+            </a:extLst>
+          </a:blip>
+          <a:srcRect/>
+          <a:stretch/>
+        </p:blipFill>
+        <p:spPr>
+          <a:xfrm>
+            <a:off x="4296000" y="1708370"/>
+            <a:ext cx="3600000" cy="3441259"/>
+          </a:xfrm>
+          <a:prstGeom prst="rect">
+            <a:avLst/>
+          </a:prstGeom>
+        </p:spPr>
+      </p:pic>
+      <p:pic>
+        <p:nvPicPr>
+          <p:cNvPr id="9" name="Picture 8">
+            <a:extLst>
+              <a:ext uri="{FF2B5EF4-FFF2-40B4-BE49-F238E27FC236}">
+                <a16:creationId xmlns:a16="http://schemas.microsoft.com/office/drawing/2014/main" id="{92DC944A-0B50-465A-9451-387774E09170}"/>
+              </a:ext>
+            </a:extLst>
+          </p:cNvPr>
+          <p:cNvPicPr>
+            <a:picLocks noChangeAspect="1"/>
+          </p:cNvPicPr>
+          <p:nvPr/>
+        </p:nvPicPr>
+        <p:blipFill>
+          <a:blip r:embed="rId4">
+            <a:extLst>
+              <a:ext uri="{28A0092B-C50C-407E-A947-70E740481C1C}">
+                <a14:useLocalDpi xmlns:a14="http://schemas.microsoft.com/office/drawing/2010/main" val="0"/>
+              </a:ext>
+            </a:extLst>
+          </a:blip>
+          <a:srcRect/>
+          <a:stretch/>
+        </p:blipFill>
+        <p:spPr>
+          <a:xfrm>
+            <a:off x="8592000" y="1708370"/>
+            <a:ext cx="3600000" cy="3441259"/>
+          </a:xfrm>
+          <a:prstGeom prst="rect">
+            <a:avLst/>
+          </a:prstGeom>
+        </p:spPr>
+      </p:pic>
     </p:spTree>
     <p:extLst>
       <p:ext uri="{BB962C8B-B14F-4D97-AF65-F5344CB8AC3E}">
-        <p14:creationId xmlns:p14="http://schemas.microsoft.com/office/powerpoint/2010/main" val="2637551100"/>
+        <p14:creationId xmlns:p14="http://schemas.microsoft.com/office/powerpoint/2010/main" val="3911837286"/>
       </p:ext>
     </p:extLst>
   </p:cSld>

</xml_diff>